<commit_message>
Attempted to do netlist on GPU, currently added lots of broken code. Moving on to DC sweep, and then transient, before fixing
</commit_message>
<xml_diff>
--- a/Milestones/Milestone2Presentation.pptx
+++ b/Milestones/Milestone2Presentation.pptx
@@ -12581,170 +12581,170 @@
         <p:spPr/>
         <p:txBody>
           <a:bodyPr>
-            <a:normAutofit fontScale="62500" lnSpcReduction="20000"/>
+            <a:normAutofit/>
           </a:bodyPr>
           <a:lstStyle/>
           <a:p>
             <a:r>
-              <a:rPr lang="en-US" dirty="0"/>
+              <a:rPr lang="en-US" sz="1200" dirty="0"/>
               <a:t>Code cleanup: overhaul on how we handle circuit elements</a:t>
             </a:r>
           </a:p>
           <a:p>
             <a:pPr lvl="1"/>
             <a:r>
-              <a:rPr lang="en-US" dirty="0"/>
+              <a:rPr lang="en-US" sz="1200" dirty="0"/>
               <a:t>Instead of separate structs and lists for each type of element, all passives are the same Element with node and parameter arrays (instead of hardcoding how many they have)</a:t>
             </a:r>
           </a:p>
           <a:p>
             <a:pPr lvl="2"/>
             <a:r>
-              <a:rPr lang="en-US" dirty="0"/>
+              <a:rPr lang="en-US" sz="1200" dirty="0"/>
               <a:t>Other than voltage sources, all passives can be stored on the same list (because VDC needs to be applied last to matrices for reasons described below</a:t>
             </a:r>
           </a:p>
           <a:p>
             <a:pPr lvl="1"/>
             <a:r>
-              <a:rPr lang="en-US" dirty="0"/>
+              <a:rPr lang="en-US" sz="1200" dirty="0"/>
               <a:t>Will need further modification to properly port netlist to GPU (currently using </a:t>
             </a:r>
             <a:r>
-              <a:rPr lang="en-US" dirty="0" err="1"/>
+              <a:rPr lang="en-US" sz="1200" dirty="0" err="1"/>
               <a:t>std</a:t>
             </a:r>
             <a:r>
-              <a:rPr lang="en-US" dirty="0"/>
+              <a:rPr lang="en-US" sz="1200" dirty="0"/>
               <a:t>::vectors for dynamic arrays)</a:t>
             </a:r>
           </a:p>
           <a:p>
             <a:r>
-              <a:rPr lang="en-US" dirty="0"/>
+              <a:rPr lang="en-US" sz="1200" dirty="0"/>
               <a:t>More edge case testing to locate and correct bugs</a:t>
             </a:r>
           </a:p>
           <a:p>
             <a:pPr lvl="1"/>
             <a:r>
-              <a:rPr lang="en-US" dirty="0"/>
+              <a:rPr lang="en-US" sz="1200" dirty="0"/>
               <a:t>Located a problem with VDC modelling (problem with conversion to I and G when neither node grounded)</a:t>
             </a:r>
           </a:p>
           <a:p>
             <a:pPr lvl="2"/>
             <a:r>
-              <a:rPr lang="en-US" dirty="0"/>
+              <a:rPr lang="en-US" sz="1200" dirty="0"/>
               <a:t>Before: Used the fact that the currents flowing out of both positive and negative node are equal to generate G and I matrix entries</a:t>
             </a:r>
           </a:p>
           <a:p>
             <a:pPr lvl="2"/>
             <a:r>
-              <a:rPr lang="en-US" dirty="0"/>
+              <a:rPr lang="en-US" sz="1200" dirty="0"/>
               <a:t>Problem: Even though </a:t>
             </a:r>
             <a:r>
-              <a:rPr lang="en-US" dirty="0" err="1"/>
+              <a:rPr lang="en-US" sz="1200" dirty="0" err="1"/>
               <a:t>Vp</a:t>
             </a:r>
             <a:r>
-              <a:rPr lang="en-US" dirty="0"/>
+              <a:rPr lang="en-US" sz="1200" dirty="0"/>
               <a:t> = </a:t>
             </a:r>
             <a:r>
-              <a:rPr lang="en-US" dirty="0" err="1"/>
+              <a:rPr lang="en-US" sz="1200" dirty="0" err="1"/>
               <a:t>Vn</a:t>
             </a:r>
             <a:r>
-              <a:rPr lang="en-US" dirty="0"/>
+              <a:rPr lang="en-US" sz="1200" dirty="0"/>
               <a:t> + Vdc used to replace on of the voltages in one of the equations to assert Vdc dependence, still both voltages dependent on G seen at each node</a:t>
             </a:r>
           </a:p>
           <a:p>
             <a:pPr lvl="2"/>
             <a:r>
-              <a:rPr lang="en-US" dirty="0"/>
+              <a:rPr lang="en-US" sz="1200" dirty="0"/>
               <a:t>Solution: seems really obvious, but </a:t>
             </a:r>
             <a:r>
-              <a:rPr lang="en-US" dirty="0" err="1"/>
+              <a:rPr lang="en-US" sz="1200" dirty="0" err="1"/>
               <a:t>Vp</a:t>
             </a:r>
             <a:r>
-              <a:rPr lang="en-US" dirty="0"/>
+              <a:rPr lang="en-US" sz="1200" dirty="0"/>
               <a:t> – </a:t>
             </a:r>
             <a:r>
-              <a:rPr lang="en-US" dirty="0" err="1"/>
+              <a:rPr lang="en-US" sz="1200" dirty="0" err="1"/>
               <a:t>Vn</a:t>
             </a:r>
             <a:r>
-              <a:rPr lang="en-US" dirty="0"/>
+              <a:rPr lang="en-US" sz="1200" dirty="0"/>
               <a:t> = Vdc, =&gt; </a:t>
             </a:r>
             <a:r>
-              <a:rPr lang="en-US" dirty="0" err="1"/>
+              <a:rPr lang="en-US" sz="1200" dirty="0" err="1"/>
               <a:t>Vp</a:t>
             </a:r>
             <a:r>
-              <a:rPr lang="en-US" dirty="0"/>
+              <a:rPr lang="en-US" sz="1200" dirty="0"/>
               <a:t>(</a:t>
             </a:r>
             <a:r>
-              <a:rPr lang="en-US" dirty="0" err="1"/>
+              <a:rPr lang="en-US" sz="1200" dirty="0" err="1"/>
               <a:t>Gx</a:t>
             </a:r>
             <a:r>
-              <a:rPr lang="en-US" dirty="0"/>
+              <a:rPr lang="en-US" sz="1200" dirty="0"/>
               <a:t>) – </a:t>
             </a:r>
             <a:r>
-              <a:rPr lang="en-US" dirty="0" err="1"/>
+              <a:rPr lang="en-US" sz="1200" dirty="0" err="1"/>
               <a:t>Vn</a:t>
             </a:r>
             <a:r>
-              <a:rPr lang="en-US" dirty="0"/>
+              <a:rPr lang="en-US" sz="1200" dirty="0"/>
               <a:t>(</a:t>
             </a:r>
             <a:r>
-              <a:rPr lang="en-US" dirty="0" err="1"/>
+              <a:rPr lang="en-US" sz="1200" dirty="0" err="1"/>
               <a:t>Gx</a:t>
             </a:r>
             <a:r>
-              <a:rPr lang="en-US" dirty="0"/>
+              <a:rPr lang="en-US" sz="1200" dirty="0"/>
               <a:t>) = Vdc(</a:t>
             </a:r>
             <a:r>
-              <a:rPr lang="en-US" dirty="0" err="1"/>
+              <a:rPr lang="en-US" sz="1200" dirty="0" err="1"/>
               <a:t>Gx</a:t>
             </a:r>
             <a:r>
-              <a:rPr lang="en-US" dirty="0"/>
+              <a:rPr lang="en-US" sz="1200" dirty="0"/>
               <a:t>) =&gt; divide by </a:t>
             </a:r>
             <a:r>
-              <a:rPr lang="en-US" dirty="0" err="1"/>
+              <a:rPr lang="en-US" sz="1200" dirty="0" err="1"/>
               <a:t>Gx</a:t>
             </a:r>
             <a:r>
-              <a:rPr lang="en-US" dirty="0"/>
+              <a:rPr lang="en-US" sz="1200" dirty="0"/>
               <a:t>. So, I use the previous method to populate the matrix for </a:t>
             </a:r>
             <a:r>
-              <a:rPr lang="en-US" dirty="0" err="1"/>
+              <a:rPr lang="en-US" sz="1200" dirty="0" err="1"/>
               <a:t>Vn</a:t>
             </a:r>
             <a:r>
-              <a:rPr lang="en-US" dirty="0"/>
+              <a:rPr lang="en-US" sz="1200" dirty="0"/>
               <a:t> but this new equation for </a:t>
             </a:r>
             <a:r>
-              <a:rPr lang="en-US" dirty="0" err="1"/>
+              <a:rPr lang="en-US" sz="1200" dirty="0" err="1"/>
               <a:t>Vp</a:t>
             </a:r>
-            <a:endParaRPr lang="en-US" dirty="0"/>
+            <a:endParaRPr lang="en-US" sz="1200" dirty="0"/>
           </a:p>
         </p:txBody>
       </p:sp>

</xml_diff>